<commit_message>
rewrote the code for individual trait models, adding LOOCV.
Changed figure colors
</commit_message>
<xml_diff>
--- a/Figures/Conceptual fig and SEM results.pptx
+++ b/Figures/Conceptual fig and SEM results.pptx
@@ -255,7 +255,7 @@
           <a:p>
             <a:fld id="{9840706E-FA51-C04C-9EE3-38C5CC5FD7F9}" type="datetimeFigureOut">
               <a:rPr lang="en-US" smtClean="0"/>
-              <a:t>11/25/20</a:t>
+              <a:t>12/22/20</a:t>
             </a:fld>
             <a:endParaRPr lang="en-US"/>
           </a:p>
@@ -425,7 +425,7 @@
           <a:p>
             <a:fld id="{9840706E-FA51-C04C-9EE3-38C5CC5FD7F9}" type="datetimeFigureOut">
               <a:rPr lang="en-US" smtClean="0"/>
-              <a:t>11/25/20</a:t>
+              <a:t>12/22/20</a:t>
             </a:fld>
             <a:endParaRPr lang="en-US"/>
           </a:p>
@@ -605,7 +605,7 @@
           <a:p>
             <a:fld id="{9840706E-FA51-C04C-9EE3-38C5CC5FD7F9}" type="datetimeFigureOut">
               <a:rPr lang="en-US" smtClean="0"/>
-              <a:t>11/25/20</a:t>
+              <a:t>12/22/20</a:t>
             </a:fld>
             <a:endParaRPr lang="en-US"/>
           </a:p>
@@ -775,7 +775,7 @@
           <a:p>
             <a:fld id="{9840706E-FA51-C04C-9EE3-38C5CC5FD7F9}" type="datetimeFigureOut">
               <a:rPr lang="en-US" smtClean="0"/>
-              <a:t>11/25/20</a:t>
+              <a:t>12/22/20</a:t>
             </a:fld>
             <a:endParaRPr lang="en-US"/>
           </a:p>
@@ -1019,7 +1019,7 @@
           <a:p>
             <a:fld id="{9840706E-FA51-C04C-9EE3-38C5CC5FD7F9}" type="datetimeFigureOut">
               <a:rPr lang="en-US" smtClean="0"/>
-              <a:t>11/25/20</a:t>
+              <a:t>12/22/20</a:t>
             </a:fld>
             <a:endParaRPr lang="en-US"/>
           </a:p>
@@ -1251,7 +1251,7 @@
           <a:p>
             <a:fld id="{9840706E-FA51-C04C-9EE3-38C5CC5FD7F9}" type="datetimeFigureOut">
               <a:rPr lang="en-US" smtClean="0"/>
-              <a:t>11/25/20</a:t>
+              <a:t>12/22/20</a:t>
             </a:fld>
             <a:endParaRPr lang="en-US"/>
           </a:p>
@@ -1618,7 +1618,7 @@
           <a:p>
             <a:fld id="{9840706E-FA51-C04C-9EE3-38C5CC5FD7F9}" type="datetimeFigureOut">
               <a:rPr lang="en-US" smtClean="0"/>
-              <a:t>11/25/20</a:t>
+              <a:t>12/22/20</a:t>
             </a:fld>
             <a:endParaRPr lang="en-US"/>
           </a:p>
@@ -1736,7 +1736,7 @@
           <a:p>
             <a:fld id="{9840706E-FA51-C04C-9EE3-38C5CC5FD7F9}" type="datetimeFigureOut">
               <a:rPr lang="en-US" smtClean="0"/>
-              <a:t>11/25/20</a:t>
+              <a:t>12/22/20</a:t>
             </a:fld>
             <a:endParaRPr lang="en-US"/>
           </a:p>
@@ -1831,7 +1831,7 @@
           <a:p>
             <a:fld id="{9840706E-FA51-C04C-9EE3-38C5CC5FD7F9}" type="datetimeFigureOut">
               <a:rPr lang="en-US" smtClean="0"/>
-              <a:t>11/25/20</a:t>
+              <a:t>12/22/20</a:t>
             </a:fld>
             <a:endParaRPr lang="en-US"/>
           </a:p>
@@ -2108,7 +2108,7 @@
           <a:p>
             <a:fld id="{9840706E-FA51-C04C-9EE3-38C5CC5FD7F9}" type="datetimeFigureOut">
               <a:rPr lang="en-US" smtClean="0"/>
-              <a:t>11/25/20</a:t>
+              <a:t>12/22/20</a:t>
             </a:fld>
             <a:endParaRPr lang="en-US"/>
           </a:p>
@@ -2365,7 +2365,7 @@
           <a:p>
             <a:fld id="{9840706E-FA51-C04C-9EE3-38C5CC5FD7F9}" type="datetimeFigureOut">
               <a:rPr lang="en-US" smtClean="0"/>
-              <a:t>11/25/20</a:t>
+              <a:t>12/22/20</a:t>
             </a:fld>
             <a:endParaRPr lang="en-US"/>
           </a:p>
@@ -2578,7 +2578,7 @@
           <a:p>
             <a:fld id="{9840706E-FA51-C04C-9EE3-38C5CC5FD7F9}" type="datetimeFigureOut">
               <a:rPr lang="en-US" smtClean="0"/>
-              <a:t>11/25/20</a:t>
+              <a:t>12/22/20</a:t>
             </a:fld>
             <a:endParaRPr lang="en-US"/>
           </a:p>
@@ -4488,6 +4488,36 @@
           <a:chExt cx="0" cy="0"/>
         </a:xfrm>
       </p:grpSpPr>
+      <p:pic>
+        <p:nvPicPr>
+          <p:cNvPr id="36" name="Picture 35">
+            <a:extLst>
+              <a:ext uri="{FF2B5EF4-FFF2-40B4-BE49-F238E27FC236}">
+                <a16:creationId xmlns:a16="http://schemas.microsoft.com/office/drawing/2014/main" id="{44883B73-7421-C344-9420-9C7935B73AEF}"/>
+              </a:ext>
+            </a:extLst>
+          </p:cNvPr>
+          <p:cNvPicPr>
+            <a:picLocks noChangeAspect="1"/>
+          </p:cNvPicPr>
+          <p:nvPr/>
+        </p:nvPicPr>
+        <p:blipFill>
+          <a:blip r:embed="rId2"/>
+          <a:stretch>
+            <a:fillRect/>
+          </a:stretch>
+        </p:blipFill>
+        <p:spPr>
+          <a:xfrm>
+            <a:off x="1643" y="5673435"/>
+            <a:ext cx="6858000" cy="3429000"/>
+          </a:xfrm>
+          <a:prstGeom prst="rect">
+            <a:avLst/>
+          </a:prstGeom>
+        </p:spPr>
+      </p:pic>
       <p:sp>
         <p:nvSpPr>
           <p:cNvPr id="4" name="Process 3">
@@ -5853,36 +5883,6 @@
           </a:p>
         </p:txBody>
       </p:sp>
-      <p:pic>
-        <p:nvPicPr>
-          <p:cNvPr id="80" name="Picture 79">
-            <a:extLst>
-              <a:ext uri="{FF2B5EF4-FFF2-40B4-BE49-F238E27FC236}">
-                <a16:creationId xmlns:a16="http://schemas.microsoft.com/office/drawing/2014/main" id="{3E3A68E6-0350-2141-9BD2-7068BC9CFBCB}"/>
-              </a:ext>
-            </a:extLst>
-          </p:cNvPr>
-          <p:cNvPicPr>
-            <a:picLocks noChangeAspect="1"/>
-          </p:cNvPicPr>
-          <p:nvPr/>
-        </p:nvPicPr>
-        <p:blipFill>
-          <a:blip r:embed="rId2"/>
-          <a:stretch>
-            <a:fillRect/>
-          </a:stretch>
-        </p:blipFill>
-        <p:spPr>
-          <a:xfrm>
-            <a:off x="-15498" y="5644809"/>
-            <a:ext cx="6858000" cy="3429000"/>
-          </a:xfrm>
-          <a:prstGeom prst="rect">
-            <a:avLst/>
-          </a:prstGeom>
-        </p:spPr>
-      </p:pic>
       <p:sp>
         <p:nvSpPr>
           <p:cNvPr id="78" name="TextBox 77">

</xml_diff>

<commit_message>
updated figures after I found an error in the sign
</commit_message>
<xml_diff>
--- a/Figures/Conceptual fig and SEM results.pptx
+++ b/Figures/Conceptual fig and SEM results.pptx
@@ -255,7 +255,7 @@
           <a:p>
             <a:fld id="{9840706E-FA51-C04C-9EE3-38C5CC5FD7F9}" type="datetimeFigureOut">
               <a:rPr lang="en-US" smtClean="0"/>
-              <a:t>12/22/20</a:t>
+              <a:t>1/25/21</a:t>
             </a:fld>
             <a:endParaRPr lang="en-US"/>
           </a:p>
@@ -425,7 +425,7 @@
           <a:p>
             <a:fld id="{9840706E-FA51-C04C-9EE3-38C5CC5FD7F9}" type="datetimeFigureOut">
               <a:rPr lang="en-US" smtClean="0"/>
-              <a:t>12/22/20</a:t>
+              <a:t>1/25/21</a:t>
             </a:fld>
             <a:endParaRPr lang="en-US"/>
           </a:p>
@@ -605,7 +605,7 @@
           <a:p>
             <a:fld id="{9840706E-FA51-C04C-9EE3-38C5CC5FD7F9}" type="datetimeFigureOut">
               <a:rPr lang="en-US" smtClean="0"/>
-              <a:t>12/22/20</a:t>
+              <a:t>1/25/21</a:t>
             </a:fld>
             <a:endParaRPr lang="en-US"/>
           </a:p>
@@ -775,7 +775,7 @@
           <a:p>
             <a:fld id="{9840706E-FA51-C04C-9EE3-38C5CC5FD7F9}" type="datetimeFigureOut">
               <a:rPr lang="en-US" smtClean="0"/>
-              <a:t>12/22/20</a:t>
+              <a:t>1/25/21</a:t>
             </a:fld>
             <a:endParaRPr lang="en-US"/>
           </a:p>
@@ -1019,7 +1019,7 @@
           <a:p>
             <a:fld id="{9840706E-FA51-C04C-9EE3-38C5CC5FD7F9}" type="datetimeFigureOut">
               <a:rPr lang="en-US" smtClean="0"/>
-              <a:t>12/22/20</a:t>
+              <a:t>1/25/21</a:t>
             </a:fld>
             <a:endParaRPr lang="en-US"/>
           </a:p>
@@ -1251,7 +1251,7 @@
           <a:p>
             <a:fld id="{9840706E-FA51-C04C-9EE3-38C5CC5FD7F9}" type="datetimeFigureOut">
               <a:rPr lang="en-US" smtClean="0"/>
-              <a:t>12/22/20</a:t>
+              <a:t>1/25/21</a:t>
             </a:fld>
             <a:endParaRPr lang="en-US"/>
           </a:p>
@@ -1618,7 +1618,7 @@
           <a:p>
             <a:fld id="{9840706E-FA51-C04C-9EE3-38C5CC5FD7F9}" type="datetimeFigureOut">
               <a:rPr lang="en-US" smtClean="0"/>
-              <a:t>12/22/20</a:t>
+              <a:t>1/25/21</a:t>
             </a:fld>
             <a:endParaRPr lang="en-US"/>
           </a:p>
@@ -1736,7 +1736,7 @@
           <a:p>
             <a:fld id="{9840706E-FA51-C04C-9EE3-38C5CC5FD7F9}" type="datetimeFigureOut">
               <a:rPr lang="en-US" smtClean="0"/>
-              <a:t>12/22/20</a:t>
+              <a:t>1/25/21</a:t>
             </a:fld>
             <a:endParaRPr lang="en-US"/>
           </a:p>
@@ -1831,7 +1831,7 @@
           <a:p>
             <a:fld id="{9840706E-FA51-C04C-9EE3-38C5CC5FD7F9}" type="datetimeFigureOut">
               <a:rPr lang="en-US" smtClean="0"/>
-              <a:t>12/22/20</a:t>
+              <a:t>1/25/21</a:t>
             </a:fld>
             <a:endParaRPr lang="en-US"/>
           </a:p>
@@ -2108,7 +2108,7 @@
           <a:p>
             <a:fld id="{9840706E-FA51-C04C-9EE3-38C5CC5FD7F9}" type="datetimeFigureOut">
               <a:rPr lang="en-US" smtClean="0"/>
-              <a:t>12/22/20</a:t>
+              <a:t>1/25/21</a:t>
             </a:fld>
             <a:endParaRPr lang="en-US"/>
           </a:p>
@@ -2365,7 +2365,7 @@
           <a:p>
             <a:fld id="{9840706E-FA51-C04C-9EE3-38C5CC5FD7F9}" type="datetimeFigureOut">
               <a:rPr lang="en-US" smtClean="0"/>
-              <a:t>12/22/20</a:t>
+              <a:t>1/25/21</a:t>
             </a:fld>
             <a:endParaRPr lang="en-US"/>
           </a:p>
@@ -2578,7 +2578,7 @@
           <a:p>
             <a:fld id="{9840706E-FA51-C04C-9EE3-38C5CC5FD7F9}" type="datetimeFigureOut">
               <a:rPr lang="en-US" smtClean="0"/>
-              <a:t>12/22/20</a:t>
+              <a:t>1/25/21</a:t>
             </a:fld>
             <a:endParaRPr lang="en-US"/>
           </a:p>
@@ -5541,7 +5541,7 @@
                 <a:latin typeface="Times New Roman" panose="02020603050405020304" pitchFamily="18" charset="0"/>
                 <a:cs typeface="Times New Roman" panose="02020603050405020304" pitchFamily="18" charset="0"/>
               </a:rPr>
-              <a:t>-0.66</a:t>
+              <a:t>0.66</a:t>
             </a:r>
           </a:p>
         </p:txBody>
@@ -5581,7 +5581,7 @@
                 <a:latin typeface="Times New Roman" panose="02020603050405020304" pitchFamily="18" charset="0"/>
                 <a:cs typeface="Times New Roman" panose="02020603050405020304" pitchFamily="18" charset="0"/>
               </a:rPr>
-              <a:t>0.61</a:t>
+              <a:t>-0.61</a:t>
             </a:r>
           </a:p>
         </p:txBody>

</xml_diff>